<commit_message>
file and code updates
1. updated output location for step_13
2. updated requirements.txt
3. updated plot scripts
</commit_message>
<xml_diff>
--- a/scripts/plot_scripts/fig_6/fig_6.pptx
+++ b/scripts/plot_scripts/fig_6/fig_6.pptx
@@ -197,7 +197,7 @@
           <a:p>
             <a:fld id="{C7F60E05-9E1D-314D-B24B-079F8B52D298}" type="datetimeFigureOut">
               <a:rPr lang="en-US" smtClean="0"/>
-              <a:t>12/21/24</a:t>
+              <a:t>12/31/24</a:t>
             </a:fld>
             <a:endParaRPr lang="en-US"/>
           </a:p>
@@ -611,7 +611,7 @@
           <a:p>
             <a:fld id="{ED5B7C40-D33D-C244-9BB4-7FF9002FC8C0}" type="datetimeFigureOut">
               <a:rPr lang="en-US" smtClean="0"/>
-              <a:t>12/21/24</a:t>
+              <a:t>12/31/24</a:t>
             </a:fld>
             <a:endParaRPr lang="en-US"/>
           </a:p>
@@ -809,7 +809,7 @@
           <a:p>
             <a:fld id="{ED5B7C40-D33D-C244-9BB4-7FF9002FC8C0}" type="datetimeFigureOut">
               <a:rPr lang="en-US" smtClean="0"/>
-              <a:t>12/21/24</a:t>
+              <a:t>12/31/24</a:t>
             </a:fld>
             <a:endParaRPr lang="en-US"/>
           </a:p>
@@ -1017,7 +1017,7 @@
           <a:p>
             <a:fld id="{ED5B7C40-D33D-C244-9BB4-7FF9002FC8C0}" type="datetimeFigureOut">
               <a:rPr lang="en-US" smtClean="0"/>
-              <a:t>12/21/24</a:t>
+              <a:t>12/31/24</a:t>
             </a:fld>
             <a:endParaRPr lang="en-US"/>
           </a:p>
@@ -1215,7 +1215,7 @@
           <a:p>
             <a:fld id="{ED5B7C40-D33D-C244-9BB4-7FF9002FC8C0}" type="datetimeFigureOut">
               <a:rPr lang="en-US" smtClean="0"/>
-              <a:t>12/21/24</a:t>
+              <a:t>12/31/24</a:t>
             </a:fld>
             <a:endParaRPr lang="en-US"/>
           </a:p>
@@ -1490,7 +1490,7 @@
           <a:p>
             <a:fld id="{ED5B7C40-D33D-C244-9BB4-7FF9002FC8C0}" type="datetimeFigureOut">
               <a:rPr lang="en-US" smtClean="0"/>
-              <a:t>12/21/24</a:t>
+              <a:t>12/31/24</a:t>
             </a:fld>
             <a:endParaRPr lang="en-US"/>
           </a:p>
@@ -1755,7 +1755,7 @@
           <a:p>
             <a:fld id="{ED5B7C40-D33D-C244-9BB4-7FF9002FC8C0}" type="datetimeFigureOut">
               <a:rPr lang="en-US" smtClean="0"/>
-              <a:t>12/21/24</a:t>
+              <a:t>12/31/24</a:t>
             </a:fld>
             <a:endParaRPr lang="en-US"/>
           </a:p>
@@ -2167,7 +2167,7 @@
           <a:p>
             <a:fld id="{ED5B7C40-D33D-C244-9BB4-7FF9002FC8C0}" type="datetimeFigureOut">
               <a:rPr lang="en-US" smtClean="0"/>
-              <a:t>12/21/24</a:t>
+              <a:t>12/31/24</a:t>
             </a:fld>
             <a:endParaRPr lang="en-US"/>
           </a:p>
@@ -2308,7 +2308,7 @@
           <a:p>
             <a:fld id="{ED5B7C40-D33D-C244-9BB4-7FF9002FC8C0}" type="datetimeFigureOut">
               <a:rPr lang="en-US" smtClean="0"/>
-              <a:t>12/21/24</a:t>
+              <a:t>12/31/24</a:t>
             </a:fld>
             <a:endParaRPr lang="en-US"/>
           </a:p>
@@ -2421,7 +2421,7 @@
           <a:p>
             <a:fld id="{ED5B7C40-D33D-C244-9BB4-7FF9002FC8C0}" type="datetimeFigureOut">
               <a:rPr lang="en-US" smtClean="0"/>
-              <a:t>12/21/24</a:t>
+              <a:t>12/31/24</a:t>
             </a:fld>
             <a:endParaRPr lang="en-US"/>
           </a:p>
@@ -2732,7 +2732,7 @@
           <a:p>
             <a:fld id="{ED5B7C40-D33D-C244-9BB4-7FF9002FC8C0}" type="datetimeFigureOut">
               <a:rPr lang="en-US" smtClean="0"/>
-              <a:t>12/21/24</a:t>
+              <a:t>12/31/24</a:t>
             </a:fld>
             <a:endParaRPr lang="en-US"/>
           </a:p>
@@ -3020,7 +3020,7 @@
           <a:p>
             <a:fld id="{ED5B7C40-D33D-C244-9BB4-7FF9002FC8C0}" type="datetimeFigureOut">
               <a:rPr lang="en-US" smtClean="0"/>
-              <a:t>12/21/24</a:t>
+              <a:t>12/31/24</a:t>
             </a:fld>
             <a:endParaRPr lang="en-US"/>
           </a:p>
@@ -3261,7 +3261,7 @@
           <a:p>
             <a:fld id="{ED5B7C40-D33D-C244-9BB4-7FF9002FC8C0}" type="datetimeFigureOut">
               <a:rPr lang="en-US" smtClean="0"/>
-              <a:t>12/21/24</a:t>
+              <a:t>12/31/24</a:t>
             </a:fld>
             <a:endParaRPr lang="en-US"/>
           </a:p>
@@ -3680,10 +3680,10 @@
       </p:grpSpPr>
       <p:grpSp>
         <p:nvGrpSpPr>
-          <p:cNvPr id="102" name="Group 101">
-            <a:extLst>
-              <a:ext uri="{FF2B5EF4-FFF2-40B4-BE49-F238E27FC236}">
-                <a16:creationId xmlns:a16="http://schemas.microsoft.com/office/drawing/2014/main" id="{5E163E56-A391-9788-C21C-7D489A1DE311}"/>
+          <p:cNvPr id="16" name="Group 15">
+            <a:extLst>
+              <a:ext uri="{FF2B5EF4-FFF2-40B4-BE49-F238E27FC236}">
+                <a16:creationId xmlns:a16="http://schemas.microsoft.com/office/drawing/2014/main" id="{9B13EFAD-A1D0-4886-D32F-2F6A34D1909B}"/>
               </a:ext>
             </a:extLst>
           </p:cNvPr>
@@ -3692,18 +3692,18 @@
         </p:nvGrpSpPr>
         <p:grpSpPr>
           <a:xfrm>
-            <a:off x="1962542" y="1228056"/>
-            <a:ext cx="8076927" cy="3279610"/>
-            <a:chOff x="1962542" y="1228056"/>
-            <a:chExt cx="8076927" cy="3279610"/>
+            <a:off x="1929972" y="1228056"/>
+            <a:ext cx="8322498" cy="3458766"/>
+            <a:chOff x="1929972" y="1228056"/>
+            <a:chExt cx="8322498" cy="3458766"/>
           </a:xfrm>
         </p:grpSpPr>
         <p:pic>
           <p:nvPicPr>
-            <p:cNvPr id="74" name="Picture 73">
+            <p:cNvPr id="13" name="Picture 12">
               <a:extLst>
                 <a:ext uri="{FF2B5EF4-FFF2-40B4-BE49-F238E27FC236}">
-                  <a16:creationId xmlns:a16="http://schemas.microsoft.com/office/drawing/2014/main" id="{EEBC6414-7E04-CFA0-10BE-B74BDF93C6B9}"/>
+                  <a16:creationId xmlns:a16="http://schemas.microsoft.com/office/drawing/2014/main" id="{F626422E-E824-9461-8A5D-281D9294F8DE}"/>
                 </a:ext>
               </a:extLst>
             </p:cNvPr>
@@ -3720,8 +3720,8 @@
           </p:blipFill>
           <p:spPr>
             <a:xfrm>
-              <a:off x="6955671" y="1258428"/>
-              <a:ext cx="3083798" cy="3249238"/>
+              <a:off x="6972268" y="1230644"/>
+              <a:ext cx="3280202" cy="3456178"/>
             </a:xfrm>
             <a:prstGeom prst="rect">
               <a:avLst/>
@@ -3730,10 +3730,10 @@
         </p:pic>
         <p:pic>
           <p:nvPicPr>
-            <p:cNvPr id="76" name="Picture 75">
+            <p:cNvPr id="15" name="Picture 14">
               <a:extLst>
                 <a:ext uri="{FF2B5EF4-FFF2-40B4-BE49-F238E27FC236}">
-                  <a16:creationId xmlns:a16="http://schemas.microsoft.com/office/drawing/2014/main" id="{59F17B2D-2F99-ADCF-27F0-E5E32824E185}"/>
+                  <a16:creationId xmlns:a16="http://schemas.microsoft.com/office/drawing/2014/main" id="{4073A236-4675-5722-7EA5-329513A92103}"/>
                 </a:ext>
               </a:extLst>
             </p:cNvPr>
@@ -3750,8 +3750,8 @@
           </p:blipFill>
           <p:spPr>
             <a:xfrm>
-              <a:off x="3531654" y="1258428"/>
-              <a:ext cx="3083798" cy="3249238"/>
+              <a:off x="3406485" y="1230644"/>
+              <a:ext cx="3280202" cy="3456178"/>
             </a:xfrm>
             <a:prstGeom prst="rect">
               <a:avLst/>
@@ -3772,7 +3772,7 @@
           </p:nvSpPr>
           <p:spPr>
             <a:xfrm>
-              <a:off x="1982093" y="1258428"/>
+              <a:off x="1929972" y="1228554"/>
               <a:ext cx="280365" cy="307777"/>
             </a:xfrm>
             <a:prstGeom prst="rect">
@@ -3848,7 +3848,7 @@
           </p:nvSpPr>
           <p:spPr>
             <a:xfrm>
-              <a:off x="7100054" y="1228057"/>
+              <a:off x="7228070" y="1228057"/>
               <a:ext cx="305348" cy="307777"/>
             </a:xfrm>
             <a:prstGeom prst="rect">
@@ -3886,7 +3886,7 @@
           </p:nvGrpSpPr>
           <p:grpSpPr>
             <a:xfrm>
-              <a:off x="1962542" y="1591703"/>
+              <a:off x="1934080" y="1641886"/>
               <a:ext cx="939594" cy="2846357"/>
               <a:chOff x="378146" y="1346215"/>
               <a:chExt cx="939594" cy="2846357"/>
@@ -5149,102 +5149,6 @@
           </p:sp>
         </p:grpSp>
       </p:grpSp>
-      <mc:AlternateContent xmlns:mc="http://schemas.openxmlformats.org/markup-compatibility/2006" xmlns:a14="http://schemas.microsoft.com/office/drawing/2010/main">
-        <mc:Choice Requires="a14">
-          <p:sp>
-            <p:nvSpPr>
-              <p:cNvPr id="2" name="TextBox 1">
-                <a:extLst>
-                  <a:ext uri="{FF2B5EF4-FFF2-40B4-BE49-F238E27FC236}">
-                    <a16:creationId xmlns:a16="http://schemas.microsoft.com/office/drawing/2014/main" id="{F27C618E-F030-7A47-76A8-BE69509F0B95}"/>
-                  </a:ext>
-                </a:extLst>
-              </p:cNvPr>
-              <p:cNvSpPr txBox="1"/>
-              <p:nvPr/>
-            </p:nvSpPr>
-            <p:spPr>
-              <a:xfrm>
-                <a:off x="5636941" y="2971800"/>
-                <a:ext cx="2000548" cy="276999"/>
-              </a:xfrm>
-              <a:prstGeom prst="rect">
-                <a:avLst/>
-              </a:prstGeom>
-              <a:noFill/>
-            </p:spPr>
-            <p:txBody>
-              <a:bodyPr wrap="none" lIns="0" tIns="0" rIns="0" bIns="0" rtlCol="0">
-                <a:spAutoFit/>
-              </a:bodyPr>
-              <a:lstStyle/>
-              <a:p>
-                <a:pPr/>
-                <a14:m>
-                  <m:oMathPara xmlns:m="http://schemas.openxmlformats.org/officeDocument/2006/math">
-                    <m:oMathParaPr>
-                      <m:jc m:val="centerGroup"/>
-                    </m:oMathParaPr>
-                    <m:oMath xmlns:m="http://schemas.openxmlformats.org/officeDocument/2006/math">
-                      <a:fld id="{825F15A7-03F4-43D7-82C5-3E23DA2F108C}" type="mathplaceholder">
-                        <a:rPr lang="en-US" i="1" smtClean="0">
-                          <a:latin typeface="Cambria Math" panose="02040503050406030204" pitchFamily="18" charset="0"/>
-                        </a:rPr>
-                        <a:t>Type equation here.</a:t>
-                      </a:fld>
-                    </m:oMath>
-                  </m:oMathPara>
-                </a14:m>
-                <a:endParaRPr lang="en-US" dirty="0"/>
-              </a:p>
-            </p:txBody>
-          </p:sp>
-        </mc:Choice>
-        <mc:Fallback xmlns="">
-          <p:sp>
-            <p:nvSpPr>
-              <p:cNvPr id="2" name="TextBox 1">
-                <a:extLst>
-                  <a:ext uri="{FF2B5EF4-FFF2-40B4-BE49-F238E27FC236}">
-                    <a16:creationId xmlns:a16="http://schemas.microsoft.com/office/drawing/2014/main" id="{F27C618E-F030-7A47-76A8-BE69509F0B95}"/>
-                  </a:ext>
-                </a:extLst>
-              </p:cNvPr>
-              <p:cNvSpPr txBox="1">
-                <a:spLocks noRot="1" noChangeAspect="1" noMove="1" noResize="1" noEditPoints="1" noAdjustHandles="1" noChangeArrowheads="1" noChangeShapeType="1" noTextEdit="1"/>
-              </p:cNvSpPr>
-              <p:nvPr/>
-            </p:nvSpPr>
-            <p:spPr>
-              <a:xfrm>
-                <a:off x="5636941" y="2971800"/>
-                <a:ext cx="2000548" cy="276999"/>
-              </a:xfrm>
-              <a:prstGeom prst="rect">
-                <a:avLst/>
-              </a:prstGeom>
-              <a:blipFill>
-                <a:blip r:embed="rId4"/>
-                <a:stretch>
-                  <a:fillRect l="-3797" t="-9091" r="-2532" b="-36364"/>
-                </a:stretch>
-              </a:blipFill>
-            </p:spPr>
-            <p:txBody>
-              <a:bodyPr/>
-              <a:lstStyle/>
-              <a:p>
-                <a:r>
-                  <a:rPr lang="en-US">
-                    <a:noFill/>
-                  </a:rPr>
-                  <a:t> </a:t>
-                </a:r>
-              </a:p>
-            </p:txBody>
-          </p:sp>
-        </mc:Fallback>
-      </mc:AlternateContent>
     </p:spTree>
     <p:extLst>
       <p:ext uri="{BB962C8B-B14F-4D97-AF65-F5344CB8AC3E}">

</xml_diff>